<commit_message>
Bunch of l2g stuff
</commit_message>
<xml_diff>
--- a/Presentations/Weekly_Presentation_Gen18_2021.pptx
+++ b/Presentations/Weekly_Presentation_Gen18_2021.pptx
@@ -240,7 +240,7 @@
             <a:pPr rtl="0"/>
             <a:fld id="{444DDF42-EA81-4D58-9E48-71D338B26FAC}" type="datetime1">
               <a:rPr lang="it-IT" smtClean="0"/>
-              <a:t>17/01/2021</a:t>
+              <a:t>18/01/2021</a:t>
             </a:fld>
             <a:endParaRPr lang="it-IT" dirty="0"/>
           </a:p>
@@ -421,7 +421,7 @@
             <a:fld id="{FABFCAD0-C8D4-46EE-8714-3DAE081602B2}" type="datetime1">
               <a:rPr lang="it-IT" smtClean="0"/>
               <a:pPr/>
-              <a:t>17/01/2021</a:t>
+              <a:t>18/01/2021</a:t>
             </a:fld>
             <a:endParaRPr lang="it-IT" dirty="0"/>
           </a:p>
@@ -6788,7 +6788,7 @@
                 </a:pPr>
                 <a:r>
                   <a:rPr lang="it-IT" dirty="0"/>
-                  <a:t>Produced using TGrapg2D and the CONT4 drawing option</a:t>
+                  <a:t>Produced using TGraph2D and the CONT4 drawing option</a:t>
                 </a:r>
               </a:p>
               <a:p>
@@ -7031,8 +7031,8 @@
           </a:prstGeom>
         </p:spPr>
       </p:pic>
-      <mc:AlternateContent xmlns:mc="http://schemas.openxmlformats.org/markup-compatibility/2006">
-        <mc:Choice xmlns:a14="http://schemas.microsoft.com/office/drawing/2010/main" Requires="a14">
+      <mc:AlternateContent xmlns:mc="http://schemas.openxmlformats.org/markup-compatibility/2006" xmlns:a14="http://schemas.microsoft.com/office/drawing/2010/main">
+        <mc:Choice Requires="a14">
           <p:sp>
             <p:nvSpPr>
               <p:cNvPr id="6" name="TextBox 5">
@@ -7220,7 +7220,7 @@
             </p:txBody>
           </p:sp>
         </mc:Choice>
-        <mc:Fallback>
+        <mc:Fallback xmlns="">
           <p:sp>
             <p:nvSpPr>
               <p:cNvPr id="6" name="TextBox 5">
@@ -7424,8 +7424,8 @@
           </a:prstGeom>
         </p:spPr>
       </p:pic>
-      <mc:AlternateContent xmlns:mc="http://schemas.openxmlformats.org/markup-compatibility/2006">
-        <mc:Choice xmlns:a14="http://schemas.microsoft.com/office/drawing/2010/main" Requires="a14">
+      <mc:AlternateContent xmlns:mc="http://schemas.openxmlformats.org/markup-compatibility/2006" xmlns:a14="http://schemas.microsoft.com/office/drawing/2010/main">
+        <mc:Choice Requires="a14">
           <p:sp>
             <p:nvSpPr>
               <p:cNvPr id="6" name="TextBox 5">
@@ -7611,7 +7611,7 @@
             </p:txBody>
           </p:sp>
         </mc:Choice>
-        <mc:Fallback>
+        <mc:Fallback xmlns="">
           <p:sp>
             <p:nvSpPr>
               <p:cNvPr id="6" name="TextBox 5">
@@ -7782,7 +7782,7 @@
       </p:sp>
       <p:pic>
         <p:nvPicPr>
-          <p:cNvPr id="5" name="Picture 4" descr="Chart, surface chart&#10;&#10;Description automatically generated">
+          <p:cNvPr id="5" name="Picture 4">
             <a:extLst>
               <a:ext uri="{FF2B5EF4-FFF2-40B4-BE49-F238E27FC236}">
                 <a16:creationId xmlns:a16="http://schemas.microsoft.com/office/drawing/2014/main" id="{225FF1EB-8E6B-478A-A997-EE0204562EF8}"/>
@@ -7802,22 +7802,21 @@
               </a:ext>
             </a:extLst>
           </a:blip>
-          <a:stretch>
-            <a:fillRect/>
-          </a:stretch>
+          <a:srcRect/>
+          <a:stretch/>
         </p:blipFill>
         <p:spPr>
           <a:xfrm>
             <a:off x="4533966" y="982116"/>
-            <a:ext cx="6811696" cy="5282819"/>
+            <a:ext cx="6811696" cy="5282818"/>
           </a:xfrm>
           <a:prstGeom prst="rect">
             <a:avLst/>
           </a:prstGeom>
         </p:spPr>
       </p:pic>
-      <mc:AlternateContent xmlns:mc="http://schemas.openxmlformats.org/markup-compatibility/2006">
-        <mc:Choice xmlns:a14="http://schemas.microsoft.com/office/drawing/2010/main" Requires="a14">
+      <mc:AlternateContent xmlns:mc="http://schemas.openxmlformats.org/markup-compatibility/2006" xmlns:a14="http://schemas.microsoft.com/office/drawing/2010/main">
+        <mc:Choice Requires="a14">
           <p:sp>
             <p:nvSpPr>
               <p:cNvPr id="6" name="TextBox 5">
@@ -8003,7 +8002,7 @@
             </p:txBody>
           </p:sp>
         </mc:Choice>
-        <mc:Fallback>
+        <mc:Fallback xmlns="">
           <p:sp>
             <p:nvSpPr>
               <p:cNvPr id="6" name="TextBox 5">
@@ -8172,8 +8171,8 @@
           </a:p>
         </p:txBody>
       </p:sp>
-      <mc:AlternateContent xmlns:mc="http://schemas.openxmlformats.org/markup-compatibility/2006">
-        <mc:Choice xmlns:a14="http://schemas.microsoft.com/office/drawing/2010/main" Requires="a14">
+      <mc:AlternateContent xmlns:mc="http://schemas.openxmlformats.org/markup-compatibility/2006" xmlns:a14="http://schemas.microsoft.com/office/drawing/2010/main">
+        <mc:Choice Requires="a14">
           <p:sp>
             <p:nvSpPr>
               <p:cNvPr id="6" name="TextBox 5">
@@ -8325,7 +8324,7 @@
                     <m:d>
                       <m:dPr>
                         <m:ctrlPr>
-                          <a:rPr lang="it-IT" sz="1600" b="0" smtClean="0">
+                          <a:rPr lang="it-IT" sz="1600" b="0" i="1" smtClean="0">
                             <a:solidFill>
                               <a:schemeClr val="accent1"/>
                             </a:solidFill>
@@ -8473,7 +8472,7 @@
             </p:txBody>
           </p:sp>
         </mc:Choice>
-        <mc:Fallback>
+        <mc:Fallback xmlns="">
           <p:sp>
             <p:nvSpPr>
               <p:cNvPr id="6" name="TextBox 5">
@@ -8677,8 +8676,8 @@
           </a:p>
         </p:txBody>
       </p:sp>
-      <mc:AlternateContent xmlns:mc="http://schemas.openxmlformats.org/markup-compatibility/2006">
-        <mc:Choice xmlns:a14="http://schemas.microsoft.com/office/drawing/2010/main" Requires="a14">
+      <mc:AlternateContent xmlns:mc="http://schemas.openxmlformats.org/markup-compatibility/2006" xmlns:a14="http://schemas.microsoft.com/office/drawing/2010/main">
+        <mc:Choice Requires="a14">
           <p:sp>
             <p:nvSpPr>
               <p:cNvPr id="6" name="TextBox 5">
@@ -9121,7 +9120,7 @@
             </p:txBody>
           </p:sp>
         </mc:Choice>
-        <mc:Fallback>
+        <mc:Fallback xmlns="">
           <p:sp>
             <p:nvSpPr>
               <p:cNvPr id="6" name="TextBox 5">
@@ -9274,8 +9273,8 @@
           </a:p>
         </p:txBody>
       </p:sp>
-      <mc:AlternateContent xmlns:mc="http://schemas.openxmlformats.org/markup-compatibility/2006">
-        <mc:Choice xmlns:a14="http://schemas.microsoft.com/office/drawing/2010/main" Requires="a14">
+      <mc:AlternateContent xmlns:mc="http://schemas.openxmlformats.org/markup-compatibility/2006" xmlns:a14="http://schemas.microsoft.com/office/drawing/2010/main">
+        <mc:Choice Requires="a14">
           <p:graphicFrame>
             <p:nvGraphicFramePr>
               <p:cNvPr id="13" name="Table 13">
@@ -10459,19 +10458,7 @@
                                   <a:rPr lang="it-IT" sz="1600" b="0" i="1" smtClean="0">
                                     <a:latin typeface="Cambria Math" panose="02040503050406030204" pitchFamily="18" charset="0"/>
                                   </a:rPr>
-                                  <m:t>=(0.</m:t>
-                                </m:r>
-                                <m:r>
-                                  <a:rPr lang="it-IT" sz="1600" b="0" i="1" smtClean="0">
-                                    <a:latin typeface="Cambria Math" panose="02040503050406030204" pitchFamily="18" charset="0"/>
-                                  </a:rPr>
-                                  <m:t>1</m:t>
-                                </m:r>
-                                <m:r>
-                                  <a:rPr lang="it-IT" sz="1600" b="0" i="1" smtClean="0">
-                                    <a:latin typeface="Cambria Math" panose="02040503050406030204" pitchFamily="18" charset="0"/>
-                                  </a:rPr>
-                                  <m:t>,3,3)</m:t>
+                                  <m:t>=(0.1,3,3)</m:t>
                                 </m:r>
                               </m:oMath>
                             </m:oMathPara>
@@ -10794,25 +10781,7 @@
                                   </a:solidFill>
                                   <a:latin typeface="Cambria Math" panose="02040503050406030204" pitchFamily="18" charset="0"/>
                                 </a:rPr>
-                                <m:t>=</m:t>
-                              </m:r>
-                              <m:r>
-                                <a:rPr lang="it-IT" sz="1400" b="0" i="1" smtClean="0">
-                                  <a:solidFill>
-                                    <a:schemeClr val="accent1"/>
-                                  </a:solidFill>
-                                  <a:latin typeface="Cambria Math" panose="02040503050406030204" pitchFamily="18" charset="0"/>
-                                </a:rPr>
-                                <m:t>0.</m:t>
-                              </m:r>
-                              <m:r>
-                                <a:rPr lang="it-IT" sz="1400" b="0" i="1" smtClean="0">
-                                  <a:solidFill>
-                                    <a:schemeClr val="accent1"/>
-                                  </a:solidFill>
-                                  <a:latin typeface="Cambria Math" panose="02040503050406030204" pitchFamily="18" charset="0"/>
-                                </a:rPr>
-                                <m:t>1</m:t>
+                                <m:t>=0.1</m:t>
                               </m:r>
                               <m:r>
                                 <a:rPr lang="it-IT" sz="1400" b="0" i="1" smtClean="0">
@@ -11827,16 +11796,7 @@
                                   </a:solidFill>
                                   <a:latin typeface="Cambria Math" panose="02040503050406030204" pitchFamily="18" charset="0"/>
                                 </a:rPr>
-                                <m:t>=</m:t>
-                              </m:r>
-                              <m:r>
-                                <a:rPr lang="it-IT" sz="1400" b="0" i="1" smtClean="0">
-                                  <a:solidFill>
-                                    <a:schemeClr val="accent1"/>
-                                  </a:solidFill>
-                                  <a:latin typeface="Cambria Math" panose="02040503050406030204" pitchFamily="18" charset="0"/>
-                                </a:rPr>
-                                <m:t>2</m:t>
+                                <m:t>=2</m:t>
                               </m:r>
                               <m:r>
                                 <a:rPr lang="it-IT" sz="1400" b="0" i="1" smtClean="0">
@@ -12074,16 +12034,7 @@
                                   </a:solidFill>
                                   <a:latin typeface="Cambria Math" panose="02040503050406030204" pitchFamily="18" charset="0"/>
                                 </a:rPr>
-                                <m:t>=</m:t>
-                              </m:r>
-                              <m:r>
-                                <a:rPr lang="it-IT" sz="1400" b="0" i="1" smtClean="0">
-                                  <a:solidFill>
-                                    <a:schemeClr val="accent1"/>
-                                  </a:solidFill>
-                                  <a:latin typeface="Cambria Math" panose="02040503050406030204" pitchFamily="18" charset="0"/>
-                                </a:rPr>
-                                <m:t>2</m:t>
+                                <m:t>=2</m:t>
                               </m:r>
                               <m:r>
                                 <a:rPr lang="it-IT" sz="1400" b="0" i="1" smtClean="0">
@@ -13610,16 +13561,7 @@
                                   </a:solidFill>
                                   <a:latin typeface="Cambria Math" panose="02040503050406030204" pitchFamily="18" charset="0"/>
                                 </a:rPr>
-                                <m:t>=</m:t>
-                              </m:r>
-                              <m:r>
-                                <a:rPr lang="it-IT" sz="1400" b="0" i="1" smtClean="0">
-                                  <a:solidFill>
-                                    <a:schemeClr val="accent1"/>
-                                  </a:solidFill>
-                                  <a:latin typeface="Cambria Math" panose="02040503050406030204" pitchFamily="18" charset="0"/>
-                                </a:rPr>
-                                <m:t>2</m:t>
+                                <m:t>=2</m:t>
                               </m:r>
                               <m:r>
                                 <a:rPr lang="it-IT" sz="1400" b="0" i="1" smtClean="0">
@@ -13870,16 +13812,7 @@
                                   </a:solidFill>
                                   <a:latin typeface="Cambria Math" panose="02040503050406030204" pitchFamily="18" charset="0"/>
                                 </a:rPr>
-                                <m:t>=</m:t>
-                              </m:r>
-                              <m:r>
-                                <a:rPr lang="it-IT" sz="1400" b="0" i="1" smtClean="0">
-                                  <a:solidFill>
-                                    <a:schemeClr val="accent1"/>
-                                  </a:solidFill>
-                                  <a:latin typeface="Cambria Math" panose="02040503050406030204" pitchFamily="18" charset="0"/>
-                                </a:rPr>
-                                <m:t>0.1</m:t>
+                                <m:t>=0.1</m:t>
                               </m:r>
                               <m:r>
                                 <a:rPr lang="it-IT" sz="1400" b="0" i="1" smtClean="0">
@@ -14288,7 +14221,7 @@
             </a:graphic>
           </p:graphicFrame>
         </mc:Choice>
-        <mc:Fallback>
+        <mc:Fallback xmlns="">
           <p:graphicFrame>
             <p:nvGraphicFramePr>
               <p:cNvPr id="13" name="Table 13">
@@ -15969,6 +15902,15 @@
 </file>
 
 <file path=customXml/item1.xml><?xml version="1.0" encoding="utf-8"?>
+<p:properties xmlns:p="http://schemas.microsoft.com/office/2006/metadata/properties" xmlns:xsi="http://www.w3.org/2001/XMLSchema-instance" xmlns:pc="http://schemas.microsoft.com/office/infopath/2007/PartnerControls">
+  <documentManagement>
+    <_ip_UnifiedCompliancePolicyUIAction xmlns="http://schemas.microsoft.com/sharepoint/v3" xsi:nil="true"/>
+    <_ip_UnifiedCompliancePolicyProperties xmlns="http://schemas.microsoft.com/sharepoint/v3" xsi:nil="true"/>
+  </documentManagement>
+</p:properties>
+</file>
+
+<file path=customXml/item2.xml><?xml version="1.0" encoding="utf-8"?>
 <ct:contentTypeSchema xmlns:ct="http://schemas.microsoft.com/office/2006/metadata/contentType" xmlns:ma="http://schemas.microsoft.com/office/2006/metadata/properties/metaAttributes" ct:_="" ma:_="" ma:contentTypeName="Document" ma:contentTypeID="0x010100DEEA25CC0A0AC24199CDC46C25B8B0BC" ma:contentTypeVersion="9" ma:contentTypeDescription="Create a new document." ma:contentTypeScope="" ma:versionID="76e25e1730b4532ab1d5e5b131a96a5a">
   <xsd:schema xmlns:xsd="http://www.w3.org/2001/XMLSchema" xmlns:xs="http://www.w3.org/2001/XMLSchema" xmlns:p="http://schemas.microsoft.com/office/2006/metadata/properties" xmlns:ns1="http://schemas.microsoft.com/sharepoint/v3" xmlns:ns2="6dc4bcd6-49db-4c07-9060-8acfc67cef9f" xmlns:ns3="fb0879af-3eba-417a-a55a-ffe6dcd6ca77" targetNamespace="http://schemas.microsoft.com/office/2006/metadata/properties" ma:root="true" ma:fieldsID="ad1e9281a84c4949647088091c718de3" ns1:_="" ns2:_="" ns3:_="">
     <xsd:import namespace="http://schemas.microsoft.com/sharepoint/v3"/>
@@ -16170,16 +16112,25 @@
 </ct:contentTypeSchema>
 </file>
 
-<file path=customXml/item2.xml><?xml version="1.0" encoding="utf-8"?>
-<p:properties xmlns:p="http://schemas.microsoft.com/office/2006/metadata/properties" xmlns:xsi="http://www.w3.org/2001/XMLSchema-instance" xmlns:pc="http://schemas.microsoft.com/office/infopath/2007/PartnerControls">
-  <documentManagement>
-    <_ip_UnifiedCompliancePolicyUIAction xmlns="http://schemas.microsoft.com/sharepoint/v3" xsi:nil="true"/>
-    <_ip_UnifiedCompliancePolicyProperties xmlns="http://schemas.microsoft.com/sharepoint/v3" xsi:nil="true"/>
-  </documentManagement>
-</p:properties>
+<file path=customXml/itemProps1.xml><?xml version="1.0" encoding="utf-8"?>
+<ds:datastoreItem xmlns:ds="http://schemas.openxmlformats.org/officeDocument/2006/customXml" ds:itemID="{8FB61CFE-D4DA-4753-A9A5-D482B9609A35}">
+  <ds:schemaRefs>
+    <ds:schemaRef ds:uri="http://purl.org/dc/terms/"/>
+    <ds:schemaRef ds:uri="http://schemas.microsoft.com/office/infopath/2007/PartnerControls"/>
+    <ds:schemaRef ds:uri="http://schemas.microsoft.com/office/2006/documentManagement/types"/>
+    <ds:schemaRef ds:uri="http://purl.org/dc/elements/1.1/"/>
+    <ds:schemaRef ds:uri="http://schemas.microsoft.com/office/2006/metadata/properties"/>
+    <ds:schemaRef ds:uri="http://schemas.openxmlformats.org/package/2006/metadata/core-properties"/>
+    <ds:schemaRef ds:uri="fb0879af-3eba-417a-a55a-ffe6dcd6ca77"/>
+    <ds:schemaRef ds:uri="6dc4bcd6-49db-4c07-9060-8acfc67cef9f"/>
+    <ds:schemaRef ds:uri="http://schemas.microsoft.com/sharepoint/v3"/>
+    <ds:schemaRef ds:uri="http://www.w3.org/XML/1998/namespace"/>
+    <ds:schemaRef ds:uri="http://purl.org/dc/dcmitype/"/>
+  </ds:schemaRefs>
+</ds:datastoreItem>
 </file>
 
-<file path=customXml/itemProps1.xml><?xml version="1.0" encoding="utf-8"?>
+<file path=customXml/itemProps2.xml><?xml version="1.0" encoding="utf-8"?>
 <ds:datastoreItem xmlns:ds="http://schemas.openxmlformats.org/officeDocument/2006/customXml" ds:itemID="{58A784AD-7888-482C-A72A-80D3063962ED}">
   <ds:schemaRefs>
     <ds:schemaRef ds:uri="http://schemas.microsoft.com/office/2006/metadata/contentType"/>
@@ -16197,22 +16148,4 @@
     <ds:schemaRef ds:uri="http://schemas.microsoft.com/internal/obd"/>
   </ds:schemaRefs>
 </ds:datastoreItem>
-</file>
-
-<file path=customXml/itemProps2.xml><?xml version="1.0" encoding="utf-8"?>
-<ds:datastoreItem xmlns:ds="http://schemas.openxmlformats.org/officeDocument/2006/customXml" ds:itemID="{8FB61CFE-D4DA-4753-A9A5-D482B9609A35}">
-  <ds:schemaRefs>
-    <ds:schemaRef ds:uri="http://purl.org/dc/terms/"/>
-    <ds:schemaRef ds:uri="http://schemas.microsoft.com/office/infopath/2007/PartnerControls"/>
-    <ds:schemaRef ds:uri="http://schemas.microsoft.com/office/2006/documentManagement/types"/>
-    <ds:schemaRef ds:uri="http://purl.org/dc/elements/1.1/"/>
-    <ds:schemaRef ds:uri="http://schemas.microsoft.com/office/2006/metadata/properties"/>
-    <ds:schemaRef ds:uri="http://schemas.openxmlformats.org/package/2006/metadata/core-properties"/>
-    <ds:schemaRef ds:uri="fb0879af-3eba-417a-a55a-ffe6dcd6ca77"/>
-    <ds:schemaRef ds:uri="6dc4bcd6-49db-4c07-9060-8acfc67cef9f"/>
-    <ds:schemaRef ds:uri="http://schemas.microsoft.com/sharepoint/v3"/>
-    <ds:schemaRef ds:uri="http://www.w3.org/XML/1998/namespace"/>
-    <ds:schemaRef ds:uri="http://purl.org/dc/dcmitype/"/>
-  </ds:schemaRefs>
-</ds:datastoreItem>
 </file>
</xml_diff>